<commit_message>
Updated- version control system
Updated- version control system with images and animation
</commit_message>
<xml_diff>
--- a/Version-Control-System.pptx
+++ b/Version-Control-System.pptx
@@ -4285,6 +4285,263 @@
   <p:clrMapOvr>
     <a:masterClrMapping/>
   </p:clrMapOvr>
+  <mc:AlternateContent xmlns:mc="http://schemas.openxmlformats.org/markup-compatibility/2006">
+    <mc:Choice xmlns:p14="http://schemas.microsoft.com/office/powerpoint/2010/main" Requires="p14">
+      <p:transition spd="med" p14:dur="700">
+        <p:fade/>
+      </p:transition>
+    </mc:Choice>
+    <mc:Fallback>
+      <p:transition spd="med">
+        <p:fade/>
+      </p:transition>
+    </mc:Fallback>
+  </mc:AlternateContent>
+  <p:timing>
+    <p:tnLst>
+      <p:par>
+        <p:cTn id="1" dur="indefinite" restart="never" nodeType="tmRoot">
+          <p:childTnLst>
+            <p:seq concurrent="1" nextAc="seek">
+              <p:cTn id="2" dur="indefinite" nodeType="mainSeq">
+                <p:childTnLst>
+                  <p:par>
+                    <p:cTn id="3" fill="hold">
+                      <p:stCondLst>
+                        <p:cond delay="indefinite"/>
+                      </p:stCondLst>
+                      <p:childTnLst>
+                        <p:par>
+                          <p:cTn id="4" fill="hold">
+                            <p:stCondLst>
+                              <p:cond delay="0"/>
+                            </p:stCondLst>
+                            <p:childTnLst>
+                              <p:par>
+                                <p:cTn id="5" presetID="10" presetClass="entr" presetSubtype="0" fill="hold" nodeType="clickEffect">
+                                  <p:stCondLst>
+                                    <p:cond delay="0"/>
+                                  </p:stCondLst>
+                                  <p:childTnLst>
+                                    <p:set>
+                                      <p:cBhvr>
+                                        <p:cTn id="6" dur="1" fill="hold">
+                                          <p:stCondLst>
+                                            <p:cond delay="0"/>
+                                          </p:stCondLst>
+                                        </p:cTn>
+                                        <p:tgtEl>
+                                          <p:spTgt spid="7"/>
+                                        </p:tgtEl>
+                                        <p:attrNameLst>
+                                          <p:attrName>style.visibility</p:attrName>
+                                        </p:attrNameLst>
+                                      </p:cBhvr>
+                                      <p:to>
+                                        <p:strVal val="visible"/>
+                                      </p:to>
+                                    </p:set>
+                                    <p:animEffect transition="in" filter="fade">
+                                      <p:cBhvr>
+                                        <p:cTn id="7" dur="500"/>
+                                        <p:tgtEl>
+                                          <p:spTgt spid="7"/>
+                                        </p:tgtEl>
+                                      </p:cBhvr>
+                                    </p:animEffect>
+                                  </p:childTnLst>
+                                </p:cTn>
+                              </p:par>
+                              <p:par>
+                                <p:cTn id="8" presetID="10" presetClass="entr" presetSubtype="0" fill="hold" grpId="0" nodeType="withEffect">
+                                  <p:stCondLst>
+                                    <p:cond delay="0"/>
+                                  </p:stCondLst>
+                                  <p:childTnLst>
+                                    <p:set>
+                                      <p:cBhvr>
+                                        <p:cTn id="9" dur="1" fill="hold">
+                                          <p:stCondLst>
+                                            <p:cond delay="0"/>
+                                          </p:stCondLst>
+                                        </p:cTn>
+                                        <p:tgtEl>
+                                          <p:spTgt spid="8"/>
+                                        </p:tgtEl>
+                                        <p:attrNameLst>
+                                          <p:attrName>style.visibility</p:attrName>
+                                        </p:attrNameLst>
+                                      </p:cBhvr>
+                                      <p:to>
+                                        <p:strVal val="visible"/>
+                                      </p:to>
+                                    </p:set>
+                                    <p:animEffect transition="in" filter="fade">
+                                      <p:cBhvr>
+                                        <p:cTn id="10" dur="500"/>
+                                        <p:tgtEl>
+                                          <p:spTgt spid="8"/>
+                                        </p:tgtEl>
+                                      </p:cBhvr>
+                                    </p:animEffect>
+                                  </p:childTnLst>
+                                </p:cTn>
+                              </p:par>
+                            </p:childTnLst>
+                          </p:cTn>
+                        </p:par>
+                      </p:childTnLst>
+                    </p:cTn>
+                  </p:par>
+                  <p:par>
+                    <p:cTn id="11" fill="hold">
+                      <p:stCondLst>
+                        <p:cond delay="indefinite"/>
+                      </p:stCondLst>
+                      <p:childTnLst>
+                        <p:par>
+                          <p:cTn id="12" fill="hold">
+                            <p:stCondLst>
+                              <p:cond delay="0"/>
+                            </p:stCondLst>
+                            <p:childTnLst>
+                              <p:par>
+                                <p:cTn id="13" presetID="10" presetClass="entr" presetSubtype="0" fill="hold" nodeType="clickEffect">
+                                  <p:stCondLst>
+                                    <p:cond delay="0"/>
+                                  </p:stCondLst>
+                                  <p:childTnLst>
+                                    <p:set>
+                                      <p:cBhvr>
+                                        <p:cTn id="14" dur="1" fill="hold">
+                                          <p:stCondLst>
+                                            <p:cond delay="0"/>
+                                          </p:stCondLst>
+                                        </p:cTn>
+                                        <p:tgtEl>
+                                          <p:spTgt spid="10"/>
+                                        </p:tgtEl>
+                                        <p:attrNameLst>
+                                          <p:attrName>style.visibility</p:attrName>
+                                        </p:attrNameLst>
+                                      </p:cBhvr>
+                                      <p:to>
+                                        <p:strVal val="visible"/>
+                                      </p:to>
+                                    </p:set>
+                                    <p:animEffect transition="in" filter="fade">
+                                      <p:cBhvr>
+                                        <p:cTn id="15" dur="500"/>
+                                        <p:tgtEl>
+                                          <p:spTgt spid="10"/>
+                                        </p:tgtEl>
+                                      </p:cBhvr>
+                                    </p:animEffect>
+                                  </p:childTnLst>
+                                </p:cTn>
+                              </p:par>
+                              <p:par>
+                                <p:cTn id="16" presetID="10" presetClass="entr" presetSubtype="0" fill="hold" grpId="0" nodeType="withEffect">
+                                  <p:stCondLst>
+                                    <p:cond delay="0"/>
+                                  </p:stCondLst>
+                                  <p:childTnLst>
+                                    <p:set>
+                                      <p:cBhvr>
+                                        <p:cTn id="17" dur="1" fill="hold">
+                                          <p:stCondLst>
+                                            <p:cond delay="0"/>
+                                          </p:stCondLst>
+                                        </p:cTn>
+                                        <p:tgtEl>
+                                          <p:spTgt spid="13"/>
+                                        </p:tgtEl>
+                                        <p:attrNameLst>
+                                          <p:attrName>style.visibility</p:attrName>
+                                        </p:attrNameLst>
+                                      </p:cBhvr>
+                                      <p:to>
+                                        <p:strVal val="visible"/>
+                                      </p:to>
+                                    </p:set>
+                                    <p:animEffect transition="in" filter="fade">
+                                      <p:cBhvr>
+                                        <p:cTn id="18" dur="500"/>
+                                        <p:tgtEl>
+                                          <p:spTgt spid="13"/>
+                                        </p:tgtEl>
+                                      </p:cBhvr>
+                                    </p:animEffect>
+                                  </p:childTnLst>
+                                </p:cTn>
+                              </p:par>
+                              <p:par>
+                                <p:cTn id="19" presetID="10" presetClass="entr" presetSubtype="0" fill="hold" nodeType="withEffect">
+                                  <p:stCondLst>
+                                    <p:cond delay="0"/>
+                                  </p:stCondLst>
+                                  <p:childTnLst>
+                                    <p:set>
+                                      <p:cBhvr>
+                                        <p:cTn id="20" dur="1" fill="hold">
+                                          <p:stCondLst>
+                                            <p:cond delay="0"/>
+                                          </p:stCondLst>
+                                        </p:cTn>
+                                        <p:tgtEl>
+                                          <p:spTgt spid="12"/>
+                                        </p:tgtEl>
+                                        <p:attrNameLst>
+                                          <p:attrName>style.visibility</p:attrName>
+                                        </p:attrNameLst>
+                                      </p:cBhvr>
+                                      <p:to>
+                                        <p:strVal val="visible"/>
+                                      </p:to>
+                                    </p:set>
+                                    <p:animEffect transition="in" filter="fade">
+                                      <p:cBhvr>
+                                        <p:cTn id="21" dur="500"/>
+                                        <p:tgtEl>
+                                          <p:spTgt spid="12"/>
+                                        </p:tgtEl>
+                                      </p:cBhvr>
+                                    </p:animEffect>
+                                  </p:childTnLst>
+                                </p:cTn>
+                              </p:par>
+                            </p:childTnLst>
+                          </p:cTn>
+                        </p:par>
+                      </p:childTnLst>
+                    </p:cTn>
+                  </p:par>
+                </p:childTnLst>
+              </p:cTn>
+              <p:prevCondLst>
+                <p:cond evt="onPrev" delay="0">
+                  <p:tgtEl>
+                    <p:sldTgt/>
+                  </p:tgtEl>
+                </p:cond>
+              </p:prevCondLst>
+              <p:nextCondLst>
+                <p:cond evt="onNext" delay="0">
+                  <p:tgtEl>
+                    <p:sldTgt/>
+                  </p:tgtEl>
+                </p:cond>
+              </p:nextCondLst>
+            </p:seq>
+          </p:childTnLst>
+        </p:cTn>
+      </p:par>
+    </p:tnLst>
+    <p:bldLst>
+      <p:bldP spid="8" grpId="0"/>
+      <p:bldP spid="13" grpId="0"/>
+    </p:bldLst>
+  </p:timing>
 </p:sld>
 </file>
 
@@ -4340,7 +4597,12 @@
             <p:ph idx="1"/>
           </p:nvPr>
         </p:nvSpPr>
-        <p:spPr/>
+        <p:spPr>
+          <a:xfrm>
+            <a:off x="838200" y="1825625"/>
+            <a:ext cx="5257800" cy="4351338"/>
+          </a:xfrm>
+        </p:spPr>
         <p:txBody>
           <a:bodyPr>
             <a:normAutofit/>
@@ -4348,7 +4610,7 @@
           <a:lstStyle/>
           <a:p>
             <a:r>
-              <a:rPr lang="en-US" sz="3600" dirty="0">
+              <a:rPr lang="en-US" dirty="0">
                 <a:latin typeface="Times New Roman" panose="02020603050405020304" pitchFamily="18" charset="0"/>
                 <a:cs typeface="Times New Roman" panose="02020603050405020304" pitchFamily="18" charset="0"/>
               </a:rPr>
@@ -4357,7 +4619,7 @@
           </a:p>
           <a:p>
             <a:r>
-              <a:rPr lang="en-US" sz="3600" dirty="0">
+              <a:rPr lang="en-US" dirty="0">
                 <a:latin typeface="Times New Roman" panose="02020603050405020304" pitchFamily="18" charset="0"/>
                 <a:cs typeface="Times New Roman" panose="02020603050405020304" pitchFamily="18" charset="0"/>
               </a:rPr>
@@ -4366,7 +4628,7 @@
           </a:p>
           <a:p>
             <a:r>
-              <a:rPr lang="en-US" sz="3600" dirty="0">
+              <a:rPr lang="en-US" dirty="0">
                 <a:latin typeface="Times New Roman" panose="02020603050405020304" pitchFamily="18" charset="0"/>
                 <a:cs typeface="Times New Roman" panose="02020603050405020304" pitchFamily="18" charset="0"/>
               </a:rPr>
@@ -4375,15 +4637,12 @@
           </a:p>
           <a:p>
             <a:r>
-              <a:rPr lang="en-US" sz="3600" dirty="0">
+              <a:rPr lang="en-US" dirty="0">
                 <a:latin typeface="Times New Roman" panose="02020603050405020304" pitchFamily="18" charset="0"/>
                 <a:cs typeface="Times New Roman" panose="02020603050405020304" pitchFamily="18" charset="0"/>
               </a:rPr>
               <a:t>Control contribution</a:t>
             </a:r>
-          </a:p>
-          <a:p>
-            <a:endParaRPr lang="en-US" sz="3600" dirty="0"/>
           </a:p>
         </p:txBody>
       </p:sp>
@@ -4442,6 +4701,42 @@
           </a:p>
         </p:txBody>
       </p:sp>
+      <p:pic>
+        <p:nvPicPr>
+          <p:cNvPr id="8" name="Picture 7">
+            <a:extLst>
+              <a:ext uri="{FF2B5EF4-FFF2-40B4-BE49-F238E27FC236}">
+                <a16:creationId xmlns:a16="http://schemas.microsoft.com/office/drawing/2014/main" id="{3570CD43-0880-4F0B-BB96-AC24840E2433}"/>
+              </a:ext>
+            </a:extLst>
+          </p:cNvPr>
+          <p:cNvPicPr>
+            <a:picLocks noChangeAspect="1"/>
+          </p:cNvPicPr>
+          <p:nvPr/>
+        </p:nvPicPr>
+        <p:blipFill>
+          <a:blip r:embed="rId2">
+            <a:extLst>
+              <a:ext uri="{28A0092B-C50C-407E-A947-70E740481C1C}">
+                <a14:useLocalDpi xmlns:a14="http://schemas.microsoft.com/office/drawing/2010/main" val="0"/>
+              </a:ext>
+            </a:extLst>
+          </a:blip>
+          <a:stretch>
+            <a:fillRect/>
+          </a:stretch>
+        </p:blipFill>
+        <p:spPr>
+          <a:xfrm>
+            <a:off x="6966661" y="1690688"/>
+            <a:ext cx="4861816" cy="3648584"/>
+          </a:xfrm>
+          <a:prstGeom prst="rect">
+            <a:avLst/>
+          </a:prstGeom>
+        </p:spPr>
+      </p:pic>
     </p:spTree>
     <p:extLst>
       <p:ext uri="{BB962C8B-B14F-4D97-AF65-F5344CB8AC3E}">
@@ -4967,16 +5262,12 @@
           </a:lstStyle>
           <a:p>
             <a:r>
-              <a:rPr lang="en-US" dirty="0" err="1">
+              <a:rPr lang="en-US" dirty="0">
                 <a:latin typeface="Times New Roman" panose="02020603050405020304" pitchFamily="18" charset="0"/>
                 <a:cs typeface="Times New Roman" panose="02020603050405020304" pitchFamily="18" charset="0"/>
               </a:rPr>
-              <a:t>GitHUb</a:t>
-            </a:r>
-            <a:endParaRPr lang="en-US" dirty="0">
-              <a:latin typeface="Times New Roman" panose="02020603050405020304" pitchFamily="18" charset="0"/>
-              <a:cs typeface="Times New Roman" panose="02020603050405020304" pitchFamily="18" charset="0"/>
-            </a:endParaRPr>
+              <a:t>GitHub</a:t>
+            </a:r>
           </a:p>
           <a:p>
             <a:r>
@@ -5561,7 +5852,7 @@
         <p:spPr>
           <a:xfrm>
             <a:off x="838200" y="1825625"/>
-            <a:ext cx="4834478" cy="4351338"/>
+            <a:ext cx="5257800" cy="4351338"/>
           </a:xfrm>
         </p:spPr>
         <p:txBody>
@@ -5569,37 +5860,55 @@
           <a:lstStyle/>
           <a:p>
             <a:r>
-              <a:rPr lang="en-US" dirty="0"/>
+              <a:rPr lang="en-US" dirty="0">
+                <a:latin typeface="Times New Roman" panose="02020603050405020304" pitchFamily="18" charset="0"/>
+                <a:cs typeface="Times New Roman" panose="02020603050405020304" pitchFamily="18" charset="0"/>
+              </a:rPr>
               <a:t>A graphical interface and cloud  of git</a:t>
             </a:r>
           </a:p>
           <a:p>
             <a:r>
-              <a:rPr lang="en-US" dirty="0"/>
+              <a:rPr lang="en-US" dirty="0">
+                <a:latin typeface="Times New Roman" panose="02020603050405020304" pitchFamily="18" charset="0"/>
+                <a:cs typeface="Times New Roman" panose="02020603050405020304" pitchFamily="18" charset="0"/>
+              </a:rPr>
               <a:t>Easier to use</a:t>
             </a:r>
           </a:p>
           <a:p>
             <a:r>
-              <a:rPr lang="en-US" dirty="0"/>
+              <a:rPr lang="en-US" dirty="0">
+                <a:latin typeface="Times New Roman" panose="02020603050405020304" pitchFamily="18" charset="0"/>
+                <a:cs typeface="Times New Roman" panose="02020603050405020304" pitchFamily="18" charset="0"/>
+              </a:rPr>
               <a:t>A great network for developers</a:t>
             </a:r>
           </a:p>
           <a:p>
             <a:r>
-              <a:rPr lang="en-US" dirty="0"/>
+              <a:rPr lang="en-US" dirty="0">
+                <a:latin typeface="Times New Roman" panose="02020603050405020304" pitchFamily="18" charset="0"/>
+                <a:cs typeface="Times New Roman" panose="02020603050405020304" pitchFamily="18" charset="0"/>
+              </a:rPr>
               <a:t>Project Trace, to do, in progress</a:t>
             </a:r>
           </a:p>
           <a:p>
             <a:r>
-              <a:rPr lang="en-US" dirty="0"/>
+              <a:rPr lang="en-US" dirty="0">
+                <a:latin typeface="Times New Roman" panose="02020603050405020304" pitchFamily="18" charset="0"/>
+                <a:cs typeface="Times New Roman" panose="02020603050405020304" pitchFamily="18" charset="0"/>
+              </a:rPr>
               <a:t>Learning platform</a:t>
             </a:r>
           </a:p>
           <a:p>
             <a:r>
-              <a:rPr lang="en-US" dirty="0"/>
+              <a:rPr lang="en-US" dirty="0">
+                <a:latin typeface="Times New Roman" panose="02020603050405020304" pitchFamily="18" charset="0"/>
+                <a:cs typeface="Times New Roman" panose="02020603050405020304" pitchFamily="18" charset="0"/>
+              </a:rPr>
               <a:t>Can be used as CV</a:t>
             </a:r>
           </a:p>
@@ -5887,43 +6196,64 @@
           <a:lstStyle/>
           <a:p>
             <a:r>
-              <a:rPr lang="en-US" dirty="0"/>
+              <a:rPr lang="en-US" dirty="0">
+                <a:latin typeface="Times New Roman" panose="02020603050405020304" pitchFamily="18" charset="0"/>
+                <a:cs typeface="Times New Roman" panose="02020603050405020304" pitchFamily="18" charset="0"/>
+              </a:rPr>
               <a:t>Helps to write manageable codes</a:t>
             </a:r>
           </a:p>
           <a:p>
             <a:r>
-              <a:rPr lang="en-US" dirty="0"/>
+              <a:rPr lang="en-US" dirty="0">
+                <a:latin typeface="Times New Roman" panose="02020603050405020304" pitchFamily="18" charset="0"/>
+                <a:cs typeface="Times New Roman" panose="02020603050405020304" pitchFamily="18" charset="0"/>
+              </a:rPr>
               <a:t>Project manager use it to manage large projects</a:t>
             </a:r>
           </a:p>
           <a:p>
             <a:r>
-              <a:rPr lang="en-US" dirty="0"/>
+              <a:rPr lang="en-US" dirty="0">
+                <a:latin typeface="Times New Roman" panose="02020603050405020304" pitchFamily="18" charset="0"/>
+                <a:cs typeface="Times New Roman" panose="02020603050405020304" pitchFamily="18" charset="0"/>
+              </a:rPr>
               <a:t>Can revert to any version using it</a:t>
             </a:r>
           </a:p>
           <a:p>
             <a:r>
-              <a:rPr lang="en-US" dirty="0"/>
+              <a:rPr lang="en-US" dirty="0">
+                <a:latin typeface="Times New Roman" panose="02020603050405020304" pitchFamily="18" charset="0"/>
+                <a:cs typeface="Times New Roman" panose="02020603050405020304" pitchFamily="18" charset="0"/>
+              </a:rPr>
               <a:t>Helps to reuse codes</a:t>
             </a:r>
           </a:p>
           <a:p>
             <a:r>
-              <a:rPr lang="en-US" dirty="0"/>
+              <a:rPr lang="en-US" dirty="0">
+                <a:latin typeface="Times New Roman" panose="02020603050405020304" pitchFamily="18" charset="0"/>
+                <a:cs typeface="Times New Roman" panose="02020603050405020304" pitchFamily="18" charset="0"/>
+              </a:rPr>
               <a:t>Can read others codes</a:t>
             </a:r>
           </a:p>
           <a:p>
             <a:r>
-              <a:rPr lang="en-US" dirty="0"/>
+              <a:rPr lang="en-US" dirty="0">
+                <a:latin typeface="Times New Roman" panose="02020603050405020304" pitchFamily="18" charset="0"/>
+                <a:cs typeface="Times New Roman" panose="02020603050405020304" pitchFamily="18" charset="0"/>
+              </a:rPr>
               <a:t>Can get idea how other solved their problem</a:t>
             </a:r>
           </a:p>
           <a:p>
             <a:r>
-              <a:rPr lang="en-US" dirty="0"/>
+              <a:rPr lang="en-US" dirty="0">
+                <a:latin typeface="Times New Roman" panose="02020603050405020304" pitchFamily="18" charset="0"/>
+                <a:cs typeface="Times New Roman" panose="02020603050405020304" pitchFamily="18" charset="0"/>
+              </a:rPr>
               <a:t>Offers a great network among developers </a:t>
             </a:r>
           </a:p>

</xml_diff>